<commit_message>
aramdno el footrer para las rpomos del mes con iamgen
</commit_message>
<xml_diff>
--- a/views/images/prodcutos de Oferta/plantilla.pptx
+++ b/views/images/prodcutos de Oferta/plantilla.pptx
@@ -104,6 +104,11 @@
       </a:defRPr>
     </a:lvl9pPr>
   </p:defaultTextStyle>
+  <p:extLst>
+    <p:ext uri="{EFAFB233-063F-42B5-8137-9DF3F51BA10A}">
+      <p15:sldGuideLst xmlns:p15="http://schemas.microsoft.com/office/powerpoint/2012/main"/>
+    </p:ext>
+  </p:extLst>
 </p:presentation>
 </file>
 
@@ -238,7 +243,7 @@
           <a:p>
             <a:fld id="{F71D6AFB-F974-4F22-B582-DC7FD9B25814}" type="datetimeFigureOut">
               <a:rPr lang="es-AR" smtClean="0"/>
-              <a:t>17/10/2020</a:t>
+              <a:t>18/10/2020</a:t>
             </a:fld>
             <a:endParaRPr lang="es-AR"/>
           </a:p>
@@ -408,7 +413,7 @@
           <a:p>
             <a:fld id="{F71D6AFB-F974-4F22-B582-DC7FD9B25814}" type="datetimeFigureOut">
               <a:rPr lang="es-AR" smtClean="0"/>
-              <a:t>17/10/2020</a:t>
+              <a:t>18/10/2020</a:t>
             </a:fld>
             <a:endParaRPr lang="es-AR"/>
           </a:p>
@@ -588,7 +593,7 @@
           <a:p>
             <a:fld id="{F71D6AFB-F974-4F22-B582-DC7FD9B25814}" type="datetimeFigureOut">
               <a:rPr lang="es-AR" smtClean="0"/>
-              <a:t>17/10/2020</a:t>
+              <a:t>18/10/2020</a:t>
             </a:fld>
             <a:endParaRPr lang="es-AR"/>
           </a:p>
@@ -758,7 +763,7 @@
           <a:p>
             <a:fld id="{F71D6AFB-F974-4F22-B582-DC7FD9B25814}" type="datetimeFigureOut">
               <a:rPr lang="es-AR" smtClean="0"/>
-              <a:t>17/10/2020</a:t>
+              <a:t>18/10/2020</a:t>
             </a:fld>
             <a:endParaRPr lang="es-AR"/>
           </a:p>
@@ -1002,7 +1007,7 @@
           <a:p>
             <a:fld id="{F71D6AFB-F974-4F22-B582-DC7FD9B25814}" type="datetimeFigureOut">
               <a:rPr lang="es-AR" smtClean="0"/>
-              <a:t>17/10/2020</a:t>
+              <a:t>18/10/2020</a:t>
             </a:fld>
             <a:endParaRPr lang="es-AR"/>
           </a:p>
@@ -1234,7 +1239,7 @@
           <a:p>
             <a:fld id="{F71D6AFB-F974-4F22-B582-DC7FD9B25814}" type="datetimeFigureOut">
               <a:rPr lang="es-AR" smtClean="0"/>
-              <a:t>17/10/2020</a:t>
+              <a:t>18/10/2020</a:t>
             </a:fld>
             <a:endParaRPr lang="es-AR"/>
           </a:p>
@@ -1601,7 +1606,7 @@
           <a:p>
             <a:fld id="{F71D6AFB-F974-4F22-B582-DC7FD9B25814}" type="datetimeFigureOut">
               <a:rPr lang="es-AR" smtClean="0"/>
-              <a:t>17/10/2020</a:t>
+              <a:t>18/10/2020</a:t>
             </a:fld>
             <a:endParaRPr lang="es-AR"/>
           </a:p>
@@ -1719,7 +1724,7 @@
           <a:p>
             <a:fld id="{F71D6AFB-F974-4F22-B582-DC7FD9B25814}" type="datetimeFigureOut">
               <a:rPr lang="es-AR" smtClean="0"/>
-              <a:t>17/10/2020</a:t>
+              <a:t>18/10/2020</a:t>
             </a:fld>
             <a:endParaRPr lang="es-AR"/>
           </a:p>
@@ -1814,7 +1819,7 @@
           <a:p>
             <a:fld id="{F71D6AFB-F974-4F22-B582-DC7FD9B25814}" type="datetimeFigureOut">
               <a:rPr lang="es-AR" smtClean="0"/>
-              <a:t>17/10/2020</a:t>
+              <a:t>18/10/2020</a:t>
             </a:fld>
             <a:endParaRPr lang="es-AR"/>
           </a:p>
@@ -2091,7 +2096,7 @@
           <a:p>
             <a:fld id="{F71D6AFB-F974-4F22-B582-DC7FD9B25814}" type="datetimeFigureOut">
               <a:rPr lang="es-AR" smtClean="0"/>
-              <a:t>17/10/2020</a:t>
+              <a:t>18/10/2020</a:t>
             </a:fld>
             <a:endParaRPr lang="es-AR"/>
           </a:p>
@@ -2348,7 +2353,7 @@
           <a:p>
             <a:fld id="{F71D6AFB-F974-4F22-B582-DC7FD9B25814}" type="datetimeFigureOut">
               <a:rPr lang="es-AR" smtClean="0"/>
-              <a:t>17/10/2020</a:t>
+              <a:t>18/10/2020</a:t>
             </a:fld>
             <a:endParaRPr lang="es-AR"/>
           </a:p>
@@ -2561,7 +2566,7 @@
           <a:p>
             <a:fld id="{F71D6AFB-F974-4F22-B582-DC7FD9B25814}" type="datetimeFigureOut">
               <a:rPr lang="es-AR" smtClean="0"/>
-              <a:t>17/10/2020</a:t>
+              <a:t>18/10/2020</a:t>
             </a:fld>
             <a:endParaRPr lang="es-AR"/>
           </a:p>
@@ -2954,9 +2959,14 @@
   <p:cSld>
     <p:bg>
       <p:bgPr>
-        <a:solidFill>
-          <a:srgbClr val="FF9900"/>
-        </a:solidFill>
+        <a:pattFill prst="pct90">
+          <a:fgClr>
+            <a:srgbClr val="FF9900"/>
+          </a:fgClr>
+          <a:bgClr>
+            <a:schemeClr val="bg1"/>
+          </a:bgClr>
+        </a:pattFill>
         <a:effectLst/>
       </p:bgPr>
     </p:bg>
@@ -2997,8 +3007,8 @@
         </p:blipFill>
         <p:spPr bwMode="auto">
           <a:xfrm>
-            <a:off x="389107" y="0"/>
-            <a:ext cx="6512600" cy="6512600"/>
+            <a:off x="130689" y="0"/>
+            <a:ext cx="7199313" cy="7199313"/>
           </a:xfrm>
           <a:prstGeom prst="rect">
             <a:avLst/>

</xml_diff>

<commit_message>
pomos para todas las marcas
</commit_message>
<xml_diff>
--- a/views/images/prodcutos de Oferta/plantilla.pptx
+++ b/views/images/prodcutos de Oferta/plantilla.pptx
@@ -243,7 +243,7 @@
           <a:p>
             <a:fld id="{F71D6AFB-F974-4F22-B582-DC7FD9B25814}" type="datetimeFigureOut">
               <a:rPr lang="es-AR" smtClean="0"/>
-              <a:t>18/10/2020</a:t>
+              <a:t>19/10/2020</a:t>
             </a:fld>
             <a:endParaRPr lang="es-AR"/>
           </a:p>
@@ -413,7 +413,7 @@
           <a:p>
             <a:fld id="{F71D6AFB-F974-4F22-B582-DC7FD9B25814}" type="datetimeFigureOut">
               <a:rPr lang="es-AR" smtClean="0"/>
-              <a:t>18/10/2020</a:t>
+              <a:t>19/10/2020</a:t>
             </a:fld>
             <a:endParaRPr lang="es-AR"/>
           </a:p>
@@ -593,7 +593,7 @@
           <a:p>
             <a:fld id="{F71D6AFB-F974-4F22-B582-DC7FD9B25814}" type="datetimeFigureOut">
               <a:rPr lang="es-AR" smtClean="0"/>
-              <a:t>18/10/2020</a:t>
+              <a:t>19/10/2020</a:t>
             </a:fld>
             <a:endParaRPr lang="es-AR"/>
           </a:p>
@@ -763,7 +763,7 @@
           <a:p>
             <a:fld id="{F71D6AFB-F974-4F22-B582-DC7FD9B25814}" type="datetimeFigureOut">
               <a:rPr lang="es-AR" smtClean="0"/>
-              <a:t>18/10/2020</a:t>
+              <a:t>19/10/2020</a:t>
             </a:fld>
             <a:endParaRPr lang="es-AR"/>
           </a:p>
@@ -1007,7 +1007,7 @@
           <a:p>
             <a:fld id="{F71D6AFB-F974-4F22-B582-DC7FD9B25814}" type="datetimeFigureOut">
               <a:rPr lang="es-AR" smtClean="0"/>
-              <a:t>18/10/2020</a:t>
+              <a:t>19/10/2020</a:t>
             </a:fld>
             <a:endParaRPr lang="es-AR"/>
           </a:p>
@@ -1239,7 +1239,7 @@
           <a:p>
             <a:fld id="{F71D6AFB-F974-4F22-B582-DC7FD9B25814}" type="datetimeFigureOut">
               <a:rPr lang="es-AR" smtClean="0"/>
-              <a:t>18/10/2020</a:t>
+              <a:t>19/10/2020</a:t>
             </a:fld>
             <a:endParaRPr lang="es-AR"/>
           </a:p>
@@ -1606,7 +1606,7 @@
           <a:p>
             <a:fld id="{F71D6AFB-F974-4F22-B582-DC7FD9B25814}" type="datetimeFigureOut">
               <a:rPr lang="es-AR" smtClean="0"/>
-              <a:t>18/10/2020</a:t>
+              <a:t>19/10/2020</a:t>
             </a:fld>
             <a:endParaRPr lang="es-AR"/>
           </a:p>
@@ -1724,7 +1724,7 @@
           <a:p>
             <a:fld id="{F71D6AFB-F974-4F22-B582-DC7FD9B25814}" type="datetimeFigureOut">
               <a:rPr lang="es-AR" smtClean="0"/>
-              <a:t>18/10/2020</a:t>
+              <a:t>19/10/2020</a:t>
             </a:fld>
             <a:endParaRPr lang="es-AR"/>
           </a:p>
@@ -1819,7 +1819,7 @@
           <a:p>
             <a:fld id="{F71D6AFB-F974-4F22-B582-DC7FD9B25814}" type="datetimeFigureOut">
               <a:rPr lang="es-AR" smtClean="0"/>
-              <a:t>18/10/2020</a:t>
+              <a:t>19/10/2020</a:t>
             </a:fld>
             <a:endParaRPr lang="es-AR"/>
           </a:p>
@@ -2096,7 +2096,7 @@
           <a:p>
             <a:fld id="{F71D6AFB-F974-4F22-B582-DC7FD9B25814}" type="datetimeFigureOut">
               <a:rPr lang="es-AR" smtClean="0"/>
-              <a:t>18/10/2020</a:t>
+              <a:t>19/10/2020</a:t>
             </a:fld>
             <a:endParaRPr lang="es-AR"/>
           </a:p>
@@ -2353,7 +2353,7 @@
           <a:p>
             <a:fld id="{F71D6AFB-F974-4F22-B582-DC7FD9B25814}" type="datetimeFigureOut">
               <a:rPr lang="es-AR" smtClean="0"/>
-              <a:t>18/10/2020</a:t>
+              <a:t>19/10/2020</a:t>
             </a:fld>
             <a:endParaRPr lang="es-AR"/>
           </a:p>
@@ -2566,7 +2566,7 @@
           <a:p>
             <a:fld id="{F71D6AFB-F974-4F22-B582-DC7FD9B25814}" type="datetimeFigureOut">
               <a:rPr lang="es-AR" smtClean="0"/>
-              <a:t>18/10/2020</a:t>
+              <a:t>19/10/2020</a:t>
             </a:fld>
             <a:endParaRPr lang="es-AR"/>
           </a:p>
@@ -2959,9 +2959,11 @@
   <p:cSld>
     <p:bg>
       <p:bgPr>
-        <a:pattFill prst="pct90">
+        <a:pattFill prst="wdUpDiag">
           <a:fgClr>
-            <a:srgbClr val="FF9900"/>
+            <a:schemeClr val="bg1">
+              <a:lumMod val="75000"/>
+            </a:schemeClr>
           </a:fgClr>
           <a:bgClr>
             <a:schemeClr val="bg1"/>
@@ -2984,16 +2986,59 @@
           <a:chExt cx="0" cy="0"/>
         </a:xfrm>
       </p:grpSpPr>
+      <p:sp>
+        <p:nvSpPr>
+          <p:cNvPr id="2" name="Triángulo rectángulo 1"/>
+          <p:cNvSpPr/>
+          <p:nvPr/>
+        </p:nvSpPr>
+        <p:spPr>
+          <a:xfrm rot="16200000">
+            <a:off x="4626668" y="4626666"/>
+            <a:ext cx="2577617" cy="2567676"/>
+          </a:xfrm>
+          <a:prstGeom prst="rtTriangle">
+            <a:avLst/>
+          </a:prstGeom>
+          <a:solidFill>
+            <a:schemeClr val="accent2"/>
+          </a:solidFill>
+        </p:spPr>
+        <p:style>
+          <a:lnRef idx="2">
+            <a:schemeClr val="accent1">
+              <a:shade val="50000"/>
+            </a:schemeClr>
+          </a:lnRef>
+          <a:fillRef idx="1">
+            <a:schemeClr val="accent1"/>
+          </a:fillRef>
+          <a:effectRef idx="0">
+            <a:schemeClr val="accent1"/>
+          </a:effectRef>
+          <a:fontRef idx="minor">
+            <a:schemeClr val="lt1"/>
+          </a:fontRef>
+        </p:style>
+        <p:txBody>
+          <a:bodyPr rtlCol="0" anchor="ctr"/>
+          <a:lstStyle/>
+          <a:p>
+            <a:pPr algn="ctr"/>
+            <a:endParaRPr lang="es-AR"/>
+          </a:p>
+        </p:txBody>
+      </p:sp>
       <p:pic>
         <p:nvPicPr>
-          <p:cNvPr id="1026" name="Picture 2" descr="Remera Clásica Manga Corta Negra"/>
+          <p:cNvPr id="3" name="Picture 2" descr="Lupa Icono PNG transparente - StickPNG"/>
           <p:cNvPicPr>
             <a:picLocks noChangeAspect="1" noChangeArrowheads="1"/>
           </p:cNvPicPr>
           <p:nvPr/>
         </p:nvPicPr>
         <p:blipFill>
-          <a:blip r:embed="rId2">
+          <a:blip r:embed="rId2" cstate="print">
             <a:extLst>
               <a:ext uri="{28A0092B-C50C-407E-A947-70E740481C1C}">
                 <a14:useLocalDpi xmlns:a14="http://schemas.microsoft.com/office/drawing/2010/main" val="0"/>
@@ -3007,8 +3052,71 @@
         </p:blipFill>
         <p:spPr bwMode="auto">
           <a:xfrm>
-            <a:off x="130689" y="0"/>
-            <a:ext cx="7199313" cy="7199313"/>
+            <a:off x="5992449" y="5946983"/>
+            <a:ext cx="1000540" cy="1000540"/>
+          </a:xfrm>
+          <a:prstGeom prst="rect">
+            <a:avLst/>
+          </a:prstGeom>
+          <a:noFill/>
+          <a:effectLst>
+            <a:outerShdw blurRad="76200" dist="50800" dir="5400000" sx="105000" sy="105000" algn="ctr" rotWithShape="0">
+              <a:schemeClr val="tx1">
+                <a:alpha val="66000"/>
+              </a:schemeClr>
+            </a:outerShdw>
+          </a:effectLst>
+          <a:extLst>
+            <a:ext uri="{909E8E84-426E-40DD-AFC4-6F175D3DCCD1}">
+              <a14:hiddenFill xmlns:a14="http://schemas.microsoft.com/office/drawing/2010/main">
+                <a:solidFill>
+                  <a:srgbClr val="FFFFFF"/>
+                </a:solidFill>
+              </a14:hiddenFill>
+            </a:ext>
+          </a:extLst>
+        </p:spPr>
+      </p:pic>
+      <p:pic>
+        <p:nvPicPr>
+          <p:cNvPr id="24" name="Picture 8" descr="Valvoline Lubricantes Gorra Con Visera en Mercado Libre Argentina"/>
+          <p:cNvPicPr>
+            <a:picLocks noChangeAspect="1" noChangeArrowheads="1"/>
+          </p:cNvPicPr>
+          <p:nvPr/>
+        </p:nvPicPr>
+        <p:blipFill>
+          <a:blip r:embed="rId3">
+            <a:extLst>
+              <a:ext uri="{BEBA8EAE-BF5A-486C-A8C5-ECC9F3942E4B}">
+                <a14:imgProps xmlns:a14="http://schemas.microsoft.com/office/drawing/2010/main">
+                  <a14:imgLayer r:embed="rId4">
+                    <a14:imgEffect>
+                      <a14:backgroundRemoval t="10000" b="97813" l="0" r="100000">
+                        <a14:foregroundMark x1="28125" y1="42188" x2="47188" y2="38438"/>
+                        <a14:foregroundMark x1="30000" y1="31250" x2="30000" y2="48750"/>
+                        <a14:foregroundMark x1="40313" y1="30625" x2="40313" y2="40938"/>
+                        <a14:foregroundMark x1="35625" y1="30625" x2="39063" y2="42188"/>
+                        <a14:foregroundMark x1="41563" y1="46563" x2="45313" y2="51875"/>
+                      </a14:backgroundRemoval>
+                    </a14:imgEffect>
+                  </a14:imgLayer>
+                </a14:imgProps>
+              </a:ext>
+              <a:ext uri="{28A0092B-C50C-407E-A947-70E740481C1C}">
+                <a14:useLocalDpi xmlns:a14="http://schemas.microsoft.com/office/drawing/2010/main" val="0"/>
+              </a:ext>
+            </a:extLst>
+          </a:blip>
+          <a:srcRect/>
+          <a:stretch>
+            <a:fillRect/>
+          </a:stretch>
+        </p:blipFill>
+        <p:spPr bwMode="auto">
+          <a:xfrm>
+            <a:off x="760743" y="755768"/>
+            <a:ext cx="5154733" cy="5154736"/>
           </a:xfrm>
           <a:prstGeom prst="rect">
             <a:avLst/>

</xml_diff>